<commit_message>
updated day 2 powerpoint
</commit_message>
<xml_diff>
--- a/Day 2 Documents/Procedural Programming Vs Object Orientation.pptx
+++ b/Day 2 Documents/Procedural Programming Vs Object Orientation.pptx
@@ -27,21 +27,23 @@
     <p:sldId id="272" r:id="rId22"/>
     <p:sldId id="273" r:id="rId23"/>
     <p:sldId id="274" r:id="rId24"/>
+    <p:sldId id="275" r:id="rId25"/>
+    <p:sldId id="276" r:id="rId26"/>
   </p:sldIdLst>
   <p:sldSz cy="5143500" cx="9144000"/>
   <p:notesSz cx="6858000" cy="9144000"/>
   <p:embeddedFontLst>
     <p:embeddedFont>
       <p:font typeface="Roboto Slab"/>
-      <p:regular r:id="rId25"/>
-      <p:bold r:id="rId26"/>
+      <p:regular r:id="rId27"/>
+      <p:bold r:id="rId28"/>
     </p:embeddedFont>
     <p:embeddedFont>
       <p:font typeface="Roboto"/>
-      <p:regular r:id="rId27"/>
-      <p:bold r:id="rId28"/>
-      <p:italic r:id="rId29"/>
-      <p:boldItalic r:id="rId30"/>
+      <p:regular r:id="rId29"/>
+      <p:bold r:id="rId30"/>
+      <p:italic r:id="rId31"/>
+      <p:boldItalic r:id="rId32"/>
     </p:embeddedFont>
   </p:embeddedFontLst>
   <p:defaultTextStyle>
@@ -1527,7 +1529,7 @@
       </p:grpSpPr>
       <p:sp>
         <p:nvSpPr>
-          <p:cNvPr id="155" name="Google Shape;155;g4b0c5c426c_0_12:notes"/>
+          <p:cNvPr id="155" name="Google Shape;155;g4b0c5c426c_0_16:notes"/>
           <p:cNvSpPr/>
           <p:nvPr>
             <p:ph idx="2" type="sldImg"/>
@@ -1562,7 +1564,7 @@
       </p:sp>
       <p:sp>
         <p:nvSpPr>
-          <p:cNvPr id="156" name="Google Shape;156;g4b0c5c426c_0_12:notes"/>
+          <p:cNvPr id="156" name="Google Shape;156;g4b0c5c426c_0_16:notes"/>
           <p:cNvSpPr txBox="1"/>
           <p:nvPr>
             <p:ph idx="1" type="body"/>
@@ -1626,7 +1628,7 @@
       </p:grpSpPr>
       <p:sp>
         <p:nvSpPr>
-          <p:cNvPr id="160" name="Google Shape;160;g4b0c5c426c_0_6:notes"/>
+          <p:cNvPr id="160" name="Google Shape;160;g4b0c5c426c_0_12:notes"/>
           <p:cNvSpPr/>
           <p:nvPr>
             <p:ph idx="2" type="sldImg"/>
@@ -1661,7 +1663,7 @@
       </p:sp>
       <p:sp>
         <p:nvSpPr>
-          <p:cNvPr id="161" name="Google Shape;161;g4b0c5c426c_0_6:notes"/>
+          <p:cNvPr id="161" name="Google Shape;161;g4b0c5c426c_0_12:notes"/>
           <p:cNvSpPr txBox="1"/>
           <p:nvPr>
             <p:ph idx="1" type="body"/>
@@ -1711,7 +1713,7 @@
   <p:cSld>
     <p:spTree>
       <p:nvGrpSpPr>
-        <p:cNvPr id="166" name="Shape 166"/>
+        <p:cNvPr id="164" name="Shape 164"/>
         <p:cNvGrpSpPr/>
         <p:nvPr/>
       </p:nvGrpSpPr>
@@ -1725,7 +1727,7 @@
       </p:grpSpPr>
       <p:sp>
         <p:nvSpPr>
-          <p:cNvPr id="167" name="Google Shape;167;g4b0c5c426c_0_0:notes"/>
+          <p:cNvPr id="165" name="Google Shape;165;g4b0c5c426c_0_6:notes"/>
           <p:cNvSpPr/>
           <p:nvPr>
             <p:ph idx="2" type="sldImg"/>
@@ -1760,7 +1762,7 @@
       </p:sp>
       <p:sp>
         <p:nvSpPr>
-          <p:cNvPr id="168" name="Google Shape;168;g4b0c5c426c_0_0:notes"/>
+          <p:cNvPr id="166" name="Google Shape;166;g4b0c5c426c_0_6:notes"/>
           <p:cNvSpPr txBox="1"/>
           <p:nvPr>
             <p:ph idx="1" type="body"/>
@@ -1860,6 +1862,204 @@
       <p:sp>
         <p:nvSpPr>
           <p:cNvPr id="67" name="Google Shape;67;g459868226b_0_63:notes"/>
+          <p:cNvSpPr txBox="1"/>
+          <p:nvPr>
+            <p:ph idx="1" type="body"/>
+          </p:nvPr>
+        </p:nvSpPr>
+        <p:spPr>
+          <a:xfrm>
+            <a:off x="685800" y="4343400"/>
+            <a:ext cx="5486400" cy="4114800"/>
+          </a:xfrm>
+          <a:prstGeom prst="rect">
+            <a:avLst/>
+          </a:prstGeom>
+        </p:spPr>
+        <p:txBody>
+          <a:bodyPr anchorCtr="0" anchor="t" bIns="91425" lIns="91425" spcFirstLastPara="1" rIns="91425" wrap="square" tIns="91425">
+            <a:noAutofit/>
+          </a:bodyPr>
+          <a:lstStyle/>
+          <a:p>
+            <a:pPr indent="0" lvl="0" marL="0" rtl="0" algn="l">
+              <a:spcBef>
+                <a:spcPts val="0"/>
+              </a:spcBef>
+              <a:spcAft>
+                <a:spcPts val="0"/>
+              </a:spcAft>
+              <a:buNone/>
+            </a:pPr>
+            <a:r>
+              <a:t/>
+            </a:r>
+            <a:endParaRPr/>
+          </a:p>
+        </p:txBody>
+      </p:sp>
+    </p:spTree>
+  </p:cSld>
+  <p:clrMapOvr>
+    <a:masterClrMapping/>
+  </p:clrMapOvr>
+</p:notes>
+</file>
+
+<file path=ppt/notesSlides/notesSlide20.xml><?xml version="1.0" encoding="utf-8"?>
+<p:notes xmlns:a="http://schemas.openxmlformats.org/drawingml/2006/main" xmlns:r="http://schemas.openxmlformats.org/officeDocument/2006/relationships" xmlns:mc="http://schemas.openxmlformats.org/markup-compatibility/2006" xmlns:mv="urn:schemas-microsoft-com:mac:vml" xmlns:p="http://schemas.openxmlformats.org/presentationml/2006/main" xmlns:c="http://schemas.openxmlformats.org/drawingml/2006/chart" xmlns:dgm="http://schemas.openxmlformats.org/drawingml/2006/diagram" xmlns:o="urn:schemas-microsoft-com:office:office" xmlns:v="urn:schemas-microsoft-com:vml" xmlns:pvml="urn:schemas-microsoft-com:office:powerpoint" xmlns:com="http://schemas.openxmlformats.org/drawingml/2006/compatibility" xmlns:p14="http://schemas.microsoft.com/office/powerpoint/2010/main" xmlns:p15="http://schemas.microsoft.com/office/powerpoint/2012/main" showMasterPhAnim="0" showMasterSp="0">
+  <p:cSld>
+    <p:spTree>
+      <p:nvGrpSpPr>
+        <p:cNvPr id="171" name="Shape 171"/>
+        <p:cNvGrpSpPr/>
+        <p:nvPr/>
+      </p:nvGrpSpPr>
+      <p:grpSpPr>
+        <a:xfrm>
+          <a:off x="0" y="0"/>
+          <a:ext cx="0" cy="0"/>
+          <a:chOff x="0" y="0"/>
+          <a:chExt cx="0" cy="0"/>
+        </a:xfrm>
+      </p:grpSpPr>
+      <p:sp>
+        <p:nvSpPr>
+          <p:cNvPr id="172" name="Google Shape;172;g4b0c5c426c_0_0:notes"/>
+          <p:cNvSpPr/>
+          <p:nvPr>
+            <p:ph idx="2" type="sldImg"/>
+          </p:nvPr>
+        </p:nvSpPr>
+        <p:spPr>
+          <a:xfrm>
+            <a:off x="381300" y="685800"/>
+            <a:ext cx="6096000" cy="3429000"/>
+          </a:xfrm>
+          <a:custGeom>
+            <a:rect b="b" l="l" r="r" t="t"/>
+            <a:pathLst>
+              <a:path extrusionOk="0" h="120000" w="120000">
+                <a:moveTo>
+                  <a:pt x="0" y="0"/>
+                </a:moveTo>
+                <a:lnTo>
+                  <a:pt x="120000" y="0"/>
+                </a:lnTo>
+                <a:lnTo>
+                  <a:pt x="120000" y="120000"/>
+                </a:lnTo>
+                <a:lnTo>
+                  <a:pt x="0" y="120000"/>
+                </a:lnTo>
+                <a:close/>
+              </a:path>
+            </a:pathLst>
+          </a:custGeom>
+        </p:spPr>
+      </p:sp>
+      <p:sp>
+        <p:nvSpPr>
+          <p:cNvPr id="173" name="Google Shape;173;g4b0c5c426c_0_0:notes"/>
+          <p:cNvSpPr txBox="1"/>
+          <p:nvPr>
+            <p:ph idx="1" type="body"/>
+          </p:nvPr>
+        </p:nvSpPr>
+        <p:spPr>
+          <a:xfrm>
+            <a:off x="685800" y="4343400"/>
+            <a:ext cx="5486400" cy="4114800"/>
+          </a:xfrm>
+          <a:prstGeom prst="rect">
+            <a:avLst/>
+          </a:prstGeom>
+        </p:spPr>
+        <p:txBody>
+          <a:bodyPr anchorCtr="0" anchor="t" bIns="91425" lIns="91425" spcFirstLastPara="1" rIns="91425" wrap="square" tIns="91425">
+            <a:noAutofit/>
+          </a:bodyPr>
+          <a:lstStyle/>
+          <a:p>
+            <a:pPr indent="0" lvl="0" marL="0" rtl="0" algn="l">
+              <a:spcBef>
+                <a:spcPts val="0"/>
+              </a:spcBef>
+              <a:spcAft>
+                <a:spcPts val="0"/>
+              </a:spcAft>
+              <a:buNone/>
+            </a:pPr>
+            <a:r>
+              <a:t/>
+            </a:r>
+            <a:endParaRPr/>
+          </a:p>
+        </p:txBody>
+      </p:sp>
+    </p:spTree>
+  </p:cSld>
+  <p:clrMapOvr>
+    <a:masterClrMapping/>
+  </p:clrMapOvr>
+</p:notes>
+</file>
+
+<file path=ppt/notesSlides/notesSlide21.xml><?xml version="1.0" encoding="utf-8"?>
+<p:notes xmlns:a="http://schemas.openxmlformats.org/drawingml/2006/main" xmlns:r="http://schemas.openxmlformats.org/officeDocument/2006/relationships" xmlns:mc="http://schemas.openxmlformats.org/markup-compatibility/2006" xmlns:mv="urn:schemas-microsoft-com:mac:vml" xmlns:p="http://schemas.openxmlformats.org/presentationml/2006/main" xmlns:c="http://schemas.openxmlformats.org/drawingml/2006/chart" xmlns:dgm="http://schemas.openxmlformats.org/drawingml/2006/diagram" xmlns:o="urn:schemas-microsoft-com:office:office" xmlns:v="urn:schemas-microsoft-com:vml" xmlns:pvml="urn:schemas-microsoft-com:office:powerpoint" xmlns:com="http://schemas.openxmlformats.org/drawingml/2006/compatibility" xmlns:p14="http://schemas.microsoft.com/office/powerpoint/2010/main" xmlns:p15="http://schemas.microsoft.com/office/powerpoint/2012/main" showMasterPhAnim="0" showMasterSp="0">
+  <p:cSld>
+    <p:spTree>
+      <p:nvGrpSpPr>
+        <p:cNvPr id="177" name="Shape 177"/>
+        <p:cNvGrpSpPr/>
+        <p:nvPr/>
+      </p:nvGrpSpPr>
+      <p:grpSpPr>
+        <a:xfrm>
+          <a:off x="0" y="0"/>
+          <a:ext cx="0" cy="0"/>
+          <a:chOff x="0" y="0"/>
+          <a:chExt cx="0" cy="0"/>
+        </a:xfrm>
+      </p:grpSpPr>
+      <p:sp>
+        <p:nvSpPr>
+          <p:cNvPr id="178" name="Google Shape;178;g4b0c5c426c_0_20:notes"/>
+          <p:cNvSpPr/>
+          <p:nvPr>
+            <p:ph idx="2" type="sldImg"/>
+          </p:nvPr>
+        </p:nvSpPr>
+        <p:spPr>
+          <a:xfrm>
+            <a:off x="381300" y="685800"/>
+            <a:ext cx="6096000" cy="3429000"/>
+          </a:xfrm>
+          <a:custGeom>
+            <a:rect b="b" l="l" r="r" t="t"/>
+            <a:pathLst>
+              <a:path extrusionOk="0" h="120000" w="120000">
+                <a:moveTo>
+                  <a:pt x="0" y="0"/>
+                </a:moveTo>
+                <a:lnTo>
+                  <a:pt x="120000" y="0"/>
+                </a:lnTo>
+                <a:lnTo>
+                  <a:pt x="120000" y="120000"/>
+                </a:lnTo>
+                <a:lnTo>
+                  <a:pt x="0" y="120000"/>
+                </a:lnTo>
+                <a:close/>
+              </a:path>
+            </a:pathLst>
+          </a:custGeom>
+        </p:spPr>
+      </p:sp>
+      <p:sp>
+        <p:nvSpPr>
+          <p:cNvPr id="179" name="Google Shape;179;g4b0c5c426c_0_20:notes"/>
           <p:cNvSpPr txBox="1"/>
           <p:nvPr>
             <p:ph idx="1" type="body"/>
@@ -9335,10 +9535,10 @@
               <a:buNone/>
             </a:pPr>
             <a:r>
-              <a:rPr lang="en"/>
-              <a:t>Game of Craps</a:t>
-            </a:r>
-            <a:endParaRPr/>
+              <a:rPr lang="en" sz="3600"/>
+              <a:t>https://github.com/daversmith/oop</a:t>
+            </a:r>
+            <a:endParaRPr sz="3600"/>
           </a:p>
         </p:txBody>
       </p:sp>
@@ -9377,8 +9577,8 @@
         </p:nvSpPr>
         <p:spPr>
           <a:xfrm>
-            <a:off x="387900" y="458025"/>
-            <a:ext cx="8368200" cy="686100"/>
+            <a:off x="480750" y="1764950"/>
+            <a:ext cx="8222100" cy="907500"/>
           </a:xfrm>
           <a:prstGeom prst="rect">
             <a:avLst/>
@@ -9390,7 +9590,7 @@
           </a:bodyPr>
           <a:lstStyle/>
           <a:p>
-            <a:pPr indent="0" lvl="0" marL="0" rtl="0" algn="l">
+            <a:pPr indent="0" lvl="0" marL="0" rtl="0" algn="ctr">
               <a:spcBef>
                 <a:spcPts val="0"/>
               </a:spcBef>
@@ -9401,119 +9601,7 @@
             </a:pPr>
             <a:r>
               <a:rPr lang="en"/>
-              <a:t>Craps Game Requirements</a:t>
-            </a:r>
-            <a:endParaRPr/>
-          </a:p>
-        </p:txBody>
-      </p:sp>
-      <p:sp>
-        <p:nvSpPr>
-          <p:cNvPr id="164" name="Google Shape;164;p30"/>
-          <p:cNvSpPr txBox="1"/>
-          <p:nvPr>
-            <p:ph idx="1" type="body"/>
-          </p:nvPr>
-        </p:nvSpPr>
-        <p:spPr>
-          <a:xfrm>
-            <a:off x="423375" y="1489825"/>
-            <a:ext cx="3999900" cy="3078900"/>
-          </a:xfrm>
-          <a:prstGeom prst="rect">
-            <a:avLst/>
-          </a:prstGeom>
-        </p:spPr>
-        <p:txBody>
-          <a:bodyPr anchorCtr="0" anchor="t" bIns="91425" lIns="91425" spcFirstLastPara="1" rIns="91425" wrap="square" tIns="91425">
-            <a:noAutofit/>
-          </a:bodyPr>
-          <a:lstStyle/>
-          <a:p>
-            <a:pPr indent="0" lvl="0" marL="0" rtl="0" algn="l">
-              <a:spcBef>
-                <a:spcPts val="0"/>
-              </a:spcBef>
-              <a:spcAft>
-                <a:spcPts val="0"/>
-              </a:spcAft>
-              <a:buNone/>
-            </a:pPr>
-            <a:r>
-              <a:rPr lang="en"/>
-              <a:t>Attributes:</a:t>
-            </a:r>
-            <a:endParaRPr/>
-          </a:p>
-          <a:p>
-            <a:pPr indent="-317500" lvl="0" marL="457200" rtl="0" algn="l">
-              <a:spcBef>
-                <a:spcPts val="1600"/>
-              </a:spcBef>
-              <a:spcAft>
-                <a:spcPts val="0"/>
-              </a:spcAft>
-              <a:buSzPts val="1400"/>
-              <a:buChar char="●"/>
-            </a:pPr>
-            <a:r>
-              <a:t/>
-            </a:r>
-            <a:endParaRPr/>
-          </a:p>
-        </p:txBody>
-      </p:sp>
-      <p:sp>
-        <p:nvSpPr>
-          <p:cNvPr id="165" name="Google Shape;165;p30"/>
-          <p:cNvSpPr txBox="1"/>
-          <p:nvPr>
-            <p:ph idx="2" type="body"/>
-          </p:nvPr>
-        </p:nvSpPr>
-        <p:spPr>
-          <a:xfrm>
-            <a:off x="4756200" y="1489825"/>
-            <a:ext cx="3999900" cy="3078900"/>
-          </a:xfrm>
-          <a:prstGeom prst="rect">
-            <a:avLst/>
-          </a:prstGeom>
-        </p:spPr>
-        <p:txBody>
-          <a:bodyPr anchorCtr="0" anchor="t" bIns="91425" lIns="91425" spcFirstLastPara="1" rIns="91425" wrap="square" tIns="91425">
-            <a:noAutofit/>
-          </a:bodyPr>
-          <a:lstStyle/>
-          <a:p>
-            <a:pPr indent="0" lvl="0" marL="0" rtl="0" algn="l">
-              <a:spcBef>
-                <a:spcPts val="0"/>
-              </a:spcBef>
-              <a:spcAft>
-                <a:spcPts val="0"/>
-              </a:spcAft>
-              <a:buNone/>
-            </a:pPr>
-            <a:r>
-              <a:rPr lang="en"/>
-              <a:t>Functionality</a:t>
-            </a:r>
-            <a:endParaRPr/>
-          </a:p>
-          <a:p>
-            <a:pPr indent="-317500" lvl="0" marL="457200" rtl="0" algn="l">
-              <a:spcBef>
-                <a:spcPts val="1600"/>
-              </a:spcBef>
-              <a:spcAft>
-                <a:spcPts val="0"/>
-              </a:spcAft>
-              <a:buSzPts val="1400"/>
-              <a:buChar char="●"/>
-            </a:pPr>
-            <a:r>
-              <a:t/>
+              <a:t>Game of Craps</a:t>
             </a:r>
             <a:endParaRPr/>
           </a:p>
@@ -9532,7 +9620,7 @@
   <p:cSld>
     <p:spTree>
       <p:nvGrpSpPr>
-        <p:cNvPr id="169" name="Shape 169"/>
+        <p:cNvPr id="167" name="Shape 167"/>
         <p:cNvGrpSpPr/>
         <p:nvPr/>
       </p:nvGrpSpPr>
@@ -9546,7 +9634,7 @@
       </p:grpSpPr>
       <p:sp>
         <p:nvSpPr>
-          <p:cNvPr id="170" name="Google Shape;170;p31"/>
+          <p:cNvPr id="168" name="Google Shape;168;p31"/>
           <p:cNvSpPr txBox="1"/>
           <p:nvPr>
             <p:ph type="title"/>
@@ -9578,7 +9666,7 @@
             </a:pPr>
             <a:r>
               <a:rPr lang="en"/>
-              <a:t>Craps Rules</a:t>
+              <a:t>Craps Game Requirements</a:t>
             </a:r>
             <a:endParaRPr/>
           </a:p>
@@ -9586,22 +9674,20 @@
       </p:sp>
       <p:sp>
         <p:nvSpPr>
-          <p:cNvPr id="171" name="Google Shape;171;p31"/>
+          <p:cNvPr id="169" name="Google Shape;169;p31"/>
           <p:cNvSpPr txBox="1"/>
-          <p:nvPr/>
+          <p:nvPr>
+            <p:ph idx="1" type="body"/>
+          </p:nvPr>
         </p:nvSpPr>
         <p:spPr>
           <a:xfrm>
-            <a:off x="1525325" y="1631725"/>
-            <a:ext cx="5108100" cy="595800"/>
+            <a:off x="423375" y="1489825"/>
+            <a:ext cx="3999900" cy="3078900"/>
           </a:xfrm>
           <a:prstGeom prst="rect">
             <a:avLst/>
           </a:prstGeom>
-          <a:noFill/>
-          <a:ln>
-            <a:noFill/>
-          </a:ln>
         </p:spPr>
         <p:txBody>
           <a:bodyPr anchorCtr="0" anchor="t" bIns="91425" lIns="91425" spcFirstLastPara="1" rIns="91425" wrap="square" tIns="91425">
@@ -9609,144 +9695,92 @@
           </a:bodyPr>
           <a:lstStyle/>
           <a:p>
-            <a:pPr indent="-342900" lvl="0" marL="457200" rtl="0" algn="l">
-              <a:spcBef>
-                <a:spcPts val="0"/>
-              </a:spcBef>
-              <a:spcAft>
-                <a:spcPts val="0"/>
-              </a:spcAft>
-              <a:buClr>
-                <a:srgbClr val="FFFFFF"/>
-              </a:buClr>
-              <a:buSzPts val="1800"/>
+            <a:pPr indent="0" lvl="0" marL="0" rtl="0" algn="l">
+              <a:spcBef>
+                <a:spcPts val="0"/>
+              </a:spcBef>
+              <a:spcAft>
+                <a:spcPts val="0"/>
+              </a:spcAft>
+              <a:buNone/>
+            </a:pPr>
+            <a:r>
+              <a:rPr lang="en"/>
+              <a:t>Attributes:</a:t>
+            </a:r>
+            <a:endParaRPr/>
+          </a:p>
+          <a:p>
+            <a:pPr indent="-317500" lvl="0" marL="457200" rtl="0" algn="l">
+              <a:spcBef>
+                <a:spcPts val="1600"/>
+              </a:spcBef>
+              <a:spcAft>
+                <a:spcPts val="0"/>
+              </a:spcAft>
+              <a:buSzPts val="1400"/>
               <a:buChar char="●"/>
             </a:pPr>
             <a:r>
-              <a:rPr lang="en" sz="1800">
-                <a:solidFill>
-                  <a:srgbClr val="FFFFFF"/>
-                </a:solidFill>
-              </a:rPr>
-              <a:t>If first roll is 7 or 11 then Winner</a:t>
-            </a:r>
-            <a:endParaRPr sz="1800">
-              <a:solidFill>
-                <a:srgbClr val="FFFFFF"/>
-              </a:solidFill>
-            </a:endParaRPr>
-          </a:p>
-          <a:p>
-            <a:pPr indent="-342900" lvl="0" marL="457200" rtl="0" algn="l">
-              <a:spcBef>
-                <a:spcPts val="0"/>
-              </a:spcBef>
-              <a:spcAft>
-                <a:spcPts val="0"/>
-              </a:spcAft>
-              <a:buClr>
-                <a:srgbClr val="FFFFFF"/>
-              </a:buClr>
-              <a:buSzPts val="1800"/>
+              <a:t/>
+            </a:r>
+            <a:endParaRPr/>
+          </a:p>
+        </p:txBody>
+      </p:sp>
+      <p:sp>
+        <p:nvSpPr>
+          <p:cNvPr id="170" name="Google Shape;170;p31"/>
+          <p:cNvSpPr txBox="1"/>
+          <p:nvPr>
+            <p:ph idx="2" type="body"/>
+          </p:nvPr>
+        </p:nvSpPr>
+        <p:spPr>
+          <a:xfrm>
+            <a:off x="4756200" y="1489825"/>
+            <a:ext cx="3999900" cy="3078900"/>
+          </a:xfrm>
+          <a:prstGeom prst="rect">
+            <a:avLst/>
+          </a:prstGeom>
+        </p:spPr>
+        <p:txBody>
+          <a:bodyPr anchorCtr="0" anchor="t" bIns="91425" lIns="91425" spcFirstLastPara="1" rIns="91425" wrap="square" tIns="91425">
+            <a:noAutofit/>
+          </a:bodyPr>
+          <a:lstStyle/>
+          <a:p>
+            <a:pPr indent="0" lvl="0" marL="0" rtl="0" algn="l">
+              <a:spcBef>
+                <a:spcPts val="0"/>
+              </a:spcBef>
+              <a:spcAft>
+                <a:spcPts val="0"/>
+              </a:spcAft>
+              <a:buNone/>
+            </a:pPr>
+            <a:r>
+              <a:rPr lang="en"/>
+              <a:t>Functionality</a:t>
+            </a:r>
+            <a:endParaRPr/>
+          </a:p>
+          <a:p>
+            <a:pPr indent="-317500" lvl="0" marL="457200" rtl="0" algn="l">
+              <a:spcBef>
+                <a:spcPts val="1600"/>
+              </a:spcBef>
+              <a:spcAft>
+                <a:spcPts val="0"/>
+              </a:spcAft>
+              <a:buSzPts val="1400"/>
               <a:buChar char="●"/>
             </a:pPr>
             <a:r>
-              <a:rPr lang="en" sz="1800">
-                <a:solidFill>
-                  <a:srgbClr val="FFFFFF"/>
-                </a:solidFill>
-              </a:rPr>
-              <a:t>If first roll is 2, 3, or 12 then Loser</a:t>
-            </a:r>
-            <a:endParaRPr sz="1800">
-              <a:solidFill>
-                <a:srgbClr val="FFFFFF"/>
-              </a:solidFill>
-            </a:endParaRPr>
-          </a:p>
-          <a:p>
-            <a:pPr indent="-342900" lvl="0" marL="457200" rtl="0" algn="l">
-              <a:spcBef>
-                <a:spcPts val="0"/>
-              </a:spcBef>
-              <a:spcAft>
-                <a:spcPts val="0"/>
-              </a:spcAft>
-              <a:buClr>
-                <a:srgbClr val="FFFFFF"/>
-              </a:buClr>
-              <a:buSzPts val="1800"/>
-              <a:buChar char="●"/>
-            </a:pPr>
-            <a:r>
-              <a:rPr lang="en" sz="1800">
-                <a:solidFill>
-                  <a:srgbClr val="FFFFFF"/>
-                </a:solidFill>
-              </a:rPr>
-              <a:t>Otherwise our goal is to re-roll the sum of the first roll</a:t>
-            </a:r>
-            <a:endParaRPr sz="1800">
-              <a:solidFill>
-                <a:srgbClr val="FFFFFF"/>
-              </a:solidFill>
-            </a:endParaRPr>
-          </a:p>
-          <a:p>
-            <a:pPr indent="-342900" lvl="0" marL="457200" rtl="0" algn="l">
-              <a:spcBef>
-                <a:spcPts val="0"/>
-              </a:spcBef>
-              <a:spcAft>
-                <a:spcPts val="0"/>
-              </a:spcAft>
-              <a:buClr>
-                <a:srgbClr val="FFFFFF"/>
-              </a:buClr>
-              <a:buSzPts val="1800"/>
-              <a:buChar char="●"/>
-            </a:pPr>
-            <a:r>
-              <a:rPr lang="en" sz="1800">
-                <a:solidFill>
-                  <a:srgbClr val="FFFFFF"/>
-                </a:solidFill>
-              </a:rPr>
-              <a:t>If a 7 or 11 is roll before goal is reached then Loser</a:t>
-            </a:r>
-            <a:endParaRPr sz="1800">
-              <a:solidFill>
-                <a:srgbClr val="FFFFFF"/>
-              </a:solidFill>
-            </a:endParaRPr>
-          </a:p>
-          <a:p>
-            <a:pPr indent="-342900" lvl="0" marL="457200" rtl="0" algn="l">
-              <a:spcBef>
-                <a:spcPts val="0"/>
-              </a:spcBef>
-              <a:spcAft>
-                <a:spcPts val="0"/>
-              </a:spcAft>
-              <a:buClr>
-                <a:srgbClr val="FFFFFF"/>
-              </a:buClr>
-              <a:buSzPts val="1800"/>
-              <a:buChar char="●"/>
-            </a:pPr>
-            <a:r>
-              <a:rPr lang="en" sz="1800">
-                <a:solidFill>
-                  <a:srgbClr val="FFFFFF"/>
-                </a:solidFill>
-              </a:rPr>
-              <a:t>If goal is reached before a 7 or 11 is rolled then Winner</a:t>
-            </a:r>
-            <a:endParaRPr sz="1800">
-              <a:solidFill>
-                <a:srgbClr val="FFFFFF"/>
-              </a:solidFill>
-            </a:endParaRPr>
+              <a:t/>
+            </a:r>
+            <a:endParaRPr/>
           </a:p>
         </p:txBody>
       </p:sp>
@@ -9989,6 +10023,302 @@
               <a:t>Benefits of OOP</a:t>
             </a:r>
             <a:endParaRPr/>
+          </a:p>
+        </p:txBody>
+      </p:sp>
+    </p:spTree>
+  </p:cSld>
+  <p:clrMapOvr>
+    <a:masterClrMapping/>
+  </p:clrMapOvr>
+</p:sld>
+</file>
+
+<file path=ppt/slides/slide20.xml><?xml version="1.0" encoding="utf-8"?>
+<p:sld xmlns:a="http://schemas.openxmlformats.org/drawingml/2006/main" xmlns:r="http://schemas.openxmlformats.org/officeDocument/2006/relationships" xmlns:mc="http://schemas.openxmlformats.org/markup-compatibility/2006" xmlns:mv="urn:schemas-microsoft-com:mac:vml" xmlns:p="http://schemas.openxmlformats.org/presentationml/2006/main" xmlns:c="http://schemas.openxmlformats.org/drawingml/2006/chart" xmlns:dgm="http://schemas.openxmlformats.org/drawingml/2006/diagram" xmlns:o="urn:schemas-microsoft-com:office:office" xmlns:v="urn:schemas-microsoft-com:vml" xmlns:pvml="urn:schemas-microsoft-com:office:powerpoint" xmlns:com="http://schemas.openxmlformats.org/drawingml/2006/compatibility" xmlns:p14="http://schemas.microsoft.com/office/powerpoint/2010/main" xmlns:p15="http://schemas.microsoft.com/office/powerpoint/2012/main">
+  <p:cSld>
+    <p:spTree>
+      <p:nvGrpSpPr>
+        <p:cNvPr id="174" name="Shape 174"/>
+        <p:cNvGrpSpPr/>
+        <p:nvPr/>
+      </p:nvGrpSpPr>
+      <p:grpSpPr>
+        <a:xfrm>
+          <a:off x="0" y="0"/>
+          <a:ext cx="0" cy="0"/>
+          <a:chOff x="0" y="0"/>
+          <a:chExt cx="0" cy="0"/>
+        </a:xfrm>
+      </p:grpSpPr>
+      <p:sp>
+        <p:nvSpPr>
+          <p:cNvPr id="175" name="Google Shape;175;p32"/>
+          <p:cNvSpPr txBox="1"/>
+          <p:nvPr>
+            <p:ph type="title"/>
+          </p:nvPr>
+        </p:nvSpPr>
+        <p:spPr>
+          <a:xfrm>
+            <a:off x="387900" y="458025"/>
+            <a:ext cx="8368200" cy="686100"/>
+          </a:xfrm>
+          <a:prstGeom prst="rect">
+            <a:avLst/>
+          </a:prstGeom>
+        </p:spPr>
+        <p:txBody>
+          <a:bodyPr anchorCtr="0" anchor="b" bIns="91425" lIns="91425" spcFirstLastPara="1" rIns="91425" wrap="square" tIns="91425">
+            <a:noAutofit/>
+          </a:bodyPr>
+          <a:lstStyle/>
+          <a:p>
+            <a:pPr indent="0" lvl="0" marL="0" rtl="0" algn="l">
+              <a:spcBef>
+                <a:spcPts val="0"/>
+              </a:spcBef>
+              <a:spcAft>
+                <a:spcPts val="0"/>
+              </a:spcAft>
+              <a:buNone/>
+            </a:pPr>
+            <a:r>
+              <a:rPr lang="en"/>
+              <a:t>Craps Rules</a:t>
+            </a:r>
+            <a:endParaRPr/>
+          </a:p>
+        </p:txBody>
+      </p:sp>
+      <p:sp>
+        <p:nvSpPr>
+          <p:cNvPr id="176" name="Google Shape;176;p32"/>
+          <p:cNvSpPr txBox="1"/>
+          <p:nvPr/>
+        </p:nvSpPr>
+        <p:spPr>
+          <a:xfrm>
+            <a:off x="1525325" y="1631725"/>
+            <a:ext cx="5108100" cy="595800"/>
+          </a:xfrm>
+          <a:prstGeom prst="rect">
+            <a:avLst/>
+          </a:prstGeom>
+          <a:noFill/>
+          <a:ln>
+            <a:noFill/>
+          </a:ln>
+        </p:spPr>
+        <p:txBody>
+          <a:bodyPr anchorCtr="0" anchor="t" bIns="91425" lIns="91425" spcFirstLastPara="1" rIns="91425" wrap="square" tIns="91425">
+            <a:noAutofit/>
+          </a:bodyPr>
+          <a:lstStyle/>
+          <a:p>
+            <a:pPr indent="-342900" lvl="0" marL="457200" rtl="0" algn="l">
+              <a:spcBef>
+                <a:spcPts val="0"/>
+              </a:spcBef>
+              <a:spcAft>
+                <a:spcPts val="0"/>
+              </a:spcAft>
+              <a:buClr>
+                <a:srgbClr val="FFFFFF"/>
+              </a:buClr>
+              <a:buSzPts val="1800"/>
+              <a:buChar char="●"/>
+            </a:pPr>
+            <a:r>
+              <a:rPr lang="en" sz="1800">
+                <a:solidFill>
+                  <a:srgbClr val="FFFFFF"/>
+                </a:solidFill>
+              </a:rPr>
+              <a:t>If first roll is 7 or 11 then Winner</a:t>
+            </a:r>
+            <a:endParaRPr sz="1800">
+              <a:solidFill>
+                <a:srgbClr val="FFFFFF"/>
+              </a:solidFill>
+            </a:endParaRPr>
+          </a:p>
+          <a:p>
+            <a:pPr indent="-342900" lvl="0" marL="457200" rtl="0" algn="l">
+              <a:spcBef>
+                <a:spcPts val="0"/>
+              </a:spcBef>
+              <a:spcAft>
+                <a:spcPts val="0"/>
+              </a:spcAft>
+              <a:buClr>
+                <a:srgbClr val="FFFFFF"/>
+              </a:buClr>
+              <a:buSzPts val="1800"/>
+              <a:buChar char="●"/>
+            </a:pPr>
+            <a:r>
+              <a:rPr lang="en" sz="1800">
+                <a:solidFill>
+                  <a:srgbClr val="FFFFFF"/>
+                </a:solidFill>
+              </a:rPr>
+              <a:t>If first roll is 2, 3, or 12 then Loser</a:t>
+            </a:r>
+            <a:endParaRPr sz="1800">
+              <a:solidFill>
+                <a:srgbClr val="FFFFFF"/>
+              </a:solidFill>
+            </a:endParaRPr>
+          </a:p>
+          <a:p>
+            <a:pPr indent="-342900" lvl="0" marL="457200" rtl="0" algn="l">
+              <a:spcBef>
+                <a:spcPts val="0"/>
+              </a:spcBef>
+              <a:spcAft>
+                <a:spcPts val="0"/>
+              </a:spcAft>
+              <a:buClr>
+                <a:srgbClr val="FFFFFF"/>
+              </a:buClr>
+              <a:buSzPts val="1800"/>
+              <a:buChar char="●"/>
+            </a:pPr>
+            <a:r>
+              <a:rPr lang="en" sz="1800">
+                <a:solidFill>
+                  <a:srgbClr val="FFFFFF"/>
+                </a:solidFill>
+              </a:rPr>
+              <a:t>Otherwise our goal is to re-roll the sum of the first roll</a:t>
+            </a:r>
+            <a:endParaRPr sz="1800">
+              <a:solidFill>
+                <a:srgbClr val="FFFFFF"/>
+              </a:solidFill>
+            </a:endParaRPr>
+          </a:p>
+          <a:p>
+            <a:pPr indent="-342900" lvl="0" marL="457200" rtl="0" algn="l">
+              <a:spcBef>
+                <a:spcPts val="0"/>
+              </a:spcBef>
+              <a:spcAft>
+                <a:spcPts val="0"/>
+              </a:spcAft>
+              <a:buClr>
+                <a:srgbClr val="FFFFFF"/>
+              </a:buClr>
+              <a:buSzPts val="1800"/>
+              <a:buChar char="●"/>
+            </a:pPr>
+            <a:r>
+              <a:rPr lang="en" sz="1800">
+                <a:solidFill>
+                  <a:srgbClr val="FFFFFF"/>
+                </a:solidFill>
+              </a:rPr>
+              <a:t>If a 7 or 11 is roll before goal is reached then Loser</a:t>
+            </a:r>
+            <a:endParaRPr sz="1800">
+              <a:solidFill>
+                <a:srgbClr val="FFFFFF"/>
+              </a:solidFill>
+            </a:endParaRPr>
+          </a:p>
+          <a:p>
+            <a:pPr indent="-342900" lvl="0" marL="457200" rtl="0" algn="l">
+              <a:spcBef>
+                <a:spcPts val="0"/>
+              </a:spcBef>
+              <a:spcAft>
+                <a:spcPts val="0"/>
+              </a:spcAft>
+              <a:buClr>
+                <a:srgbClr val="FFFFFF"/>
+              </a:buClr>
+              <a:buSzPts val="1800"/>
+              <a:buChar char="●"/>
+            </a:pPr>
+            <a:r>
+              <a:rPr lang="en" sz="1800">
+                <a:solidFill>
+                  <a:srgbClr val="FFFFFF"/>
+                </a:solidFill>
+              </a:rPr>
+              <a:t>If goal is reached before a 7 or 11 is rolled then Winner</a:t>
+            </a:r>
+            <a:endParaRPr sz="1800">
+              <a:solidFill>
+                <a:srgbClr val="FFFFFF"/>
+              </a:solidFill>
+            </a:endParaRPr>
+          </a:p>
+        </p:txBody>
+      </p:sp>
+    </p:spTree>
+  </p:cSld>
+  <p:clrMapOvr>
+    <a:masterClrMapping/>
+  </p:clrMapOvr>
+</p:sld>
+</file>
+
+<file path=ppt/slides/slide21.xml><?xml version="1.0" encoding="utf-8"?>
+<p:sld xmlns:a="http://schemas.openxmlformats.org/drawingml/2006/main" xmlns:r="http://schemas.openxmlformats.org/officeDocument/2006/relationships" xmlns:mc="http://schemas.openxmlformats.org/markup-compatibility/2006" xmlns:mv="urn:schemas-microsoft-com:mac:vml" xmlns:p="http://schemas.openxmlformats.org/presentationml/2006/main" xmlns:c="http://schemas.openxmlformats.org/drawingml/2006/chart" xmlns:dgm="http://schemas.openxmlformats.org/drawingml/2006/diagram" xmlns:o="urn:schemas-microsoft-com:office:office" xmlns:v="urn:schemas-microsoft-com:vml" xmlns:pvml="urn:schemas-microsoft-com:office:powerpoint" xmlns:com="http://schemas.openxmlformats.org/drawingml/2006/compatibility" xmlns:p14="http://schemas.microsoft.com/office/powerpoint/2010/main" xmlns:p15="http://schemas.microsoft.com/office/powerpoint/2012/main">
+  <p:cSld>
+    <p:spTree>
+      <p:nvGrpSpPr>
+        <p:cNvPr id="180" name="Shape 180"/>
+        <p:cNvGrpSpPr/>
+        <p:nvPr/>
+      </p:nvGrpSpPr>
+      <p:grpSpPr>
+        <a:xfrm>
+          <a:off x="0" y="0"/>
+          <a:ext cx="0" cy="0"/>
+          <a:chOff x="0" y="0"/>
+          <a:chExt cx="0" cy="0"/>
+        </a:xfrm>
+      </p:grpSpPr>
+      <p:sp>
+        <p:nvSpPr>
+          <p:cNvPr id="181" name="Google Shape;181;p33"/>
+          <p:cNvSpPr txBox="1"/>
+          <p:nvPr>
+            <p:ph type="title"/>
+          </p:nvPr>
+        </p:nvSpPr>
+        <p:spPr>
+          <a:xfrm>
+            <a:off x="480750" y="1764950"/>
+            <a:ext cx="8222100" cy="907500"/>
+          </a:xfrm>
+          <a:prstGeom prst="rect">
+            <a:avLst/>
+          </a:prstGeom>
+        </p:spPr>
+        <p:txBody>
+          <a:bodyPr anchorCtr="0" anchor="b" bIns="91425" lIns="91425" spcFirstLastPara="1" rIns="91425" wrap="square" tIns="91425">
+            <a:noAutofit/>
+          </a:bodyPr>
+          <a:lstStyle/>
+          <a:p>
+            <a:pPr indent="0" lvl="0" marL="0" rtl="0" algn="ctr">
+              <a:spcBef>
+                <a:spcPts val="0"/>
+              </a:spcBef>
+              <a:spcAft>
+                <a:spcPts val="0"/>
+              </a:spcAft>
+              <a:buNone/>
+            </a:pPr>
+            <a:r>
+              <a:rPr lang="en" sz="3600"/>
+              <a:t>DRSMITH@PASADENA.EDU</a:t>
+            </a:r>
+            <a:endParaRPr sz="3600"/>
           </a:p>
         </p:txBody>
       </p:sp>

</xml_diff>